<commit_message>
Corrigido slide exemplo de processo de atualização de pesos em perceptron de 1 camada.
</commit_message>
<xml_diff>
--- a/redes neurais - implementacoes sem frameworks/02 - slide - perceptron de 1 camada - processo de atualizacao de pesos.pptx
+++ b/redes neurais - implementacoes sem frameworks/02 - slide - perceptron de 1 camada - processo de atualizacao de pesos.pptx
@@ -218,7 +218,7 @@
           <a:p>
             <a:fld id="{CBD9C816-7C30-4BA8-B54B-B691C0B2C5E2}" type="datetimeFigureOut">
               <a:rPr lang="pt-BR" smtClean="0"/>
-              <a:t>03/05/2021</a:t>
+              <a:t>04/05/2021</a:t>
             </a:fld>
             <a:endParaRPr lang="pt-BR"/>
           </a:p>
@@ -632,7 +632,7 @@
           <a:p>
             <a:fld id="{D1EDC653-D730-452A-9118-0137BB926316}" type="datetimeFigureOut">
               <a:rPr lang="pt-BR" smtClean="0"/>
-              <a:t>03/05/2021</a:t>
+              <a:t>04/05/2021</a:t>
             </a:fld>
             <a:endParaRPr lang="pt-BR"/>
           </a:p>
@@ -830,7 +830,7 @@
           <a:p>
             <a:fld id="{D1EDC653-D730-452A-9118-0137BB926316}" type="datetimeFigureOut">
               <a:rPr lang="pt-BR" smtClean="0"/>
-              <a:t>03/05/2021</a:t>
+              <a:t>04/05/2021</a:t>
             </a:fld>
             <a:endParaRPr lang="pt-BR"/>
           </a:p>
@@ -1038,7 +1038,7 @@
           <a:p>
             <a:fld id="{D1EDC653-D730-452A-9118-0137BB926316}" type="datetimeFigureOut">
               <a:rPr lang="pt-BR" smtClean="0"/>
-              <a:t>03/05/2021</a:t>
+              <a:t>04/05/2021</a:t>
             </a:fld>
             <a:endParaRPr lang="pt-BR"/>
           </a:p>
@@ -1236,7 +1236,7 @@
           <a:p>
             <a:fld id="{D1EDC653-D730-452A-9118-0137BB926316}" type="datetimeFigureOut">
               <a:rPr lang="pt-BR" smtClean="0"/>
-              <a:t>03/05/2021</a:t>
+              <a:t>04/05/2021</a:t>
             </a:fld>
             <a:endParaRPr lang="pt-BR"/>
           </a:p>
@@ -1511,7 +1511,7 @@
           <a:p>
             <a:fld id="{D1EDC653-D730-452A-9118-0137BB926316}" type="datetimeFigureOut">
               <a:rPr lang="pt-BR" smtClean="0"/>
-              <a:t>03/05/2021</a:t>
+              <a:t>04/05/2021</a:t>
             </a:fld>
             <a:endParaRPr lang="pt-BR"/>
           </a:p>
@@ -1776,7 +1776,7 @@
           <a:p>
             <a:fld id="{D1EDC653-D730-452A-9118-0137BB926316}" type="datetimeFigureOut">
               <a:rPr lang="pt-BR" smtClean="0"/>
-              <a:t>03/05/2021</a:t>
+              <a:t>04/05/2021</a:t>
             </a:fld>
             <a:endParaRPr lang="pt-BR"/>
           </a:p>
@@ -2188,7 +2188,7 @@
           <a:p>
             <a:fld id="{D1EDC653-D730-452A-9118-0137BB926316}" type="datetimeFigureOut">
               <a:rPr lang="pt-BR" smtClean="0"/>
-              <a:t>03/05/2021</a:t>
+              <a:t>04/05/2021</a:t>
             </a:fld>
             <a:endParaRPr lang="pt-BR"/>
           </a:p>
@@ -2329,7 +2329,7 @@
           <a:p>
             <a:fld id="{D1EDC653-D730-452A-9118-0137BB926316}" type="datetimeFigureOut">
               <a:rPr lang="pt-BR" smtClean="0"/>
-              <a:t>03/05/2021</a:t>
+              <a:t>04/05/2021</a:t>
             </a:fld>
             <a:endParaRPr lang="pt-BR"/>
           </a:p>
@@ -2442,7 +2442,7 @@
           <a:p>
             <a:fld id="{D1EDC653-D730-452A-9118-0137BB926316}" type="datetimeFigureOut">
               <a:rPr lang="pt-BR" smtClean="0"/>
-              <a:t>03/05/2021</a:t>
+              <a:t>04/05/2021</a:t>
             </a:fld>
             <a:endParaRPr lang="pt-BR"/>
           </a:p>
@@ -2753,7 +2753,7 @@
           <a:p>
             <a:fld id="{D1EDC653-D730-452A-9118-0137BB926316}" type="datetimeFigureOut">
               <a:rPr lang="pt-BR" smtClean="0"/>
-              <a:t>03/05/2021</a:t>
+              <a:t>04/05/2021</a:t>
             </a:fld>
             <a:endParaRPr lang="pt-BR"/>
           </a:p>
@@ -3041,7 +3041,7 @@
           <a:p>
             <a:fld id="{D1EDC653-D730-452A-9118-0137BB926316}" type="datetimeFigureOut">
               <a:rPr lang="pt-BR" smtClean="0"/>
-              <a:t>03/05/2021</a:t>
+              <a:t>04/05/2021</a:t>
             </a:fld>
             <a:endParaRPr lang="pt-BR"/>
           </a:p>
@@ -3282,7 +3282,7 @@
           <a:p>
             <a:fld id="{D1EDC653-D730-452A-9118-0137BB926316}" type="datetimeFigureOut">
               <a:rPr lang="pt-BR" smtClean="0"/>
-              <a:t>03/05/2021</a:t>
+              <a:t>04/05/2021</a:t>
             </a:fld>
             <a:endParaRPr lang="pt-BR"/>
           </a:p>
@@ -3683,7 +3683,7 @@
 </file>
 
 <file path=ppt/slides/slide1.xml><?xml version="1.0" encoding="utf-8"?>
-<p:sld xmlns:a="http://schemas.openxmlformats.org/drawingml/2006/main" xmlns:r="http://schemas.openxmlformats.org/officeDocument/2006/relationships" xmlns:p="http://schemas.openxmlformats.org/presentationml/2006/main">
+<p:sld xmlns:a="http://schemas.openxmlformats.org/drawingml/2006/main" xmlns:r="http://schemas.openxmlformats.org/officeDocument/2006/relationships" xmlns:p="http://schemas.openxmlformats.org/presentationml/2006/main" show="0">
   <p:cSld>
     <p:spTree>
       <p:nvGrpSpPr>
@@ -3957,8 +3957,8 @@
           </a:p>
         </p:txBody>
       </p:sp>
-      <mc:AlternateContent xmlns:mc="http://schemas.openxmlformats.org/markup-compatibility/2006">
-        <mc:Choice xmlns:a14="http://schemas.microsoft.com/office/drawing/2010/main" Requires="a14">
+      <mc:AlternateContent xmlns:mc="http://schemas.openxmlformats.org/markup-compatibility/2006" xmlns:a14="http://schemas.microsoft.com/office/drawing/2010/main">
+        <mc:Choice Requires="a14">
           <p:sp>
             <p:nvSpPr>
               <p:cNvPr id="25" name="CaixaDeTexto 24">
@@ -4084,7 +4084,7 @@
             </p:txBody>
           </p:sp>
         </mc:Choice>
-        <mc:Fallback>
+        <mc:Fallback xmlns="">
           <p:sp>
             <p:nvSpPr>
               <p:cNvPr id="25" name="CaixaDeTexto 24">
@@ -6677,10 +6677,10 @@
   </p:clrMapOvr>
   <mc:AlternateContent xmlns:mc="http://schemas.openxmlformats.org/markup-compatibility/2006">
     <mc:Choice xmlns:p14="http://schemas.microsoft.com/office/powerpoint/2010/main" Requires="p14">
-      <p:transition spd="slow" p14:dur="2000" advTm="8679"/>
+      <p:transition spd="slow" p14:dur="2000" advTm="5535"/>
     </mc:Choice>
     <mc:Fallback>
-      <p:transition spd="slow" advTm="8679"/>
+      <p:transition spd="slow" advTm="5535"/>
     </mc:Fallback>
   </mc:AlternateContent>
 </p:sld>
@@ -6961,8 +6961,8 @@
           </a:p>
         </p:txBody>
       </p:sp>
-      <mc:AlternateContent xmlns:mc="http://schemas.openxmlformats.org/markup-compatibility/2006">
-        <mc:Choice xmlns:a14="http://schemas.microsoft.com/office/drawing/2010/main" Requires="a14">
+      <mc:AlternateContent xmlns:mc="http://schemas.openxmlformats.org/markup-compatibility/2006" xmlns:a14="http://schemas.microsoft.com/office/drawing/2010/main">
+        <mc:Choice Requires="a14">
           <p:sp>
             <p:nvSpPr>
               <p:cNvPr id="25" name="CaixaDeTexto 24">
@@ -7088,7 +7088,7 @@
             </p:txBody>
           </p:sp>
         </mc:Choice>
-        <mc:Fallback>
+        <mc:Fallback xmlns="">
           <p:sp>
             <p:nvSpPr>
               <p:cNvPr id="25" name="CaixaDeTexto 24">
@@ -9179,10 +9179,10 @@
   </p:clrMapOvr>
   <mc:AlternateContent xmlns:mc="http://schemas.openxmlformats.org/markup-compatibility/2006">
     <mc:Choice xmlns:p14="http://schemas.microsoft.com/office/powerpoint/2010/main" Requires="p14">
-      <p:transition spd="slow" p14:dur="2000" advTm="5991"/>
+      <p:transition spd="slow" p14:dur="2000" advTm="3065"/>
     </mc:Choice>
     <mc:Fallback>
-      <p:transition spd="slow" advTm="5991"/>
+      <p:transition spd="slow" advTm="3065"/>
     </mc:Fallback>
   </mc:AlternateContent>
   <p:timing>
@@ -9729,8 +9729,8 @@
           </a:p>
         </p:txBody>
       </p:sp>
-      <mc:AlternateContent xmlns:mc="http://schemas.openxmlformats.org/markup-compatibility/2006">
-        <mc:Choice xmlns:a14="http://schemas.microsoft.com/office/drawing/2010/main" Requires="a14">
+      <mc:AlternateContent xmlns:mc="http://schemas.openxmlformats.org/markup-compatibility/2006" xmlns:a14="http://schemas.microsoft.com/office/drawing/2010/main">
+        <mc:Choice Requires="a14">
           <p:sp>
             <p:nvSpPr>
               <p:cNvPr id="25" name="CaixaDeTexto 24">
@@ -9856,7 +9856,7 @@
             </p:txBody>
           </p:sp>
         </mc:Choice>
-        <mc:Fallback>
+        <mc:Fallback xmlns="">
           <p:sp>
             <p:nvSpPr>
               <p:cNvPr id="25" name="CaixaDeTexto 24">
@@ -11975,10 +11975,10 @@
   </p:clrMapOvr>
   <mc:AlternateContent xmlns:mc="http://schemas.openxmlformats.org/markup-compatibility/2006">
     <mc:Choice xmlns:p14="http://schemas.microsoft.com/office/powerpoint/2010/main" Requires="p14">
-      <p:transition spd="slow" p14:dur="2000" advTm="5320"/>
+      <p:transition spd="slow" p14:dur="2000" advTm="1415"/>
     </mc:Choice>
     <mc:Fallback>
-      <p:transition spd="slow" advTm="5320"/>
+      <p:transition spd="slow" advTm="1415"/>
     </mc:Fallback>
   </mc:AlternateContent>
   <p:timing>
@@ -12525,8 +12525,8 @@
           </a:p>
         </p:txBody>
       </p:sp>
-      <mc:AlternateContent xmlns:mc="http://schemas.openxmlformats.org/markup-compatibility/2006">
-        <mc:Choice xmlns:a14="http://schemas.microsoft.com/office/drawing/2010/main" Requires="a14">
+      <mc:AlternateContent xmlns:mc="http://schemas.openxmlformats.org/markup-compatibility/2006" xmlns:a14="http://schemas.microsoft.com/office/drawing/2010/main">
+        <mc:Choice Requires="a14">
           <p:sp>
             <p:nvSpPr>
               <p:cNvPr id="25" name="CaixaDeTexto 24">
@@ -12652,7 +12652,7 @@
             </p:txBody>
           </p:sp>
         </mc:Choice>
-        <mc:Fallback>
+        <mc:Fallback xmlns="">
           <p:sp>
             <p:nvSpPr>
               <p:cNvPr id="25" name="CaixaDeTexto 24">
@@ -14760,10 +14760,10 @@
   </p:clrMapOvr>
   <mc:AlternateContent xmlns:mc="http://schemas.openxmlformats.org/markup-compatibility/2006">
     <mc:Choice xmlns:p14="http://schemas.microsoft.com/office/powerpoint/2010/main" Requires="p14">
-      <p:transition spd="slow" p14:dur="2000" advTm="4999"/>
+      <p:transition spd="slow" p14:dur="2000" advTm="2600"/>
     </mc:Choice>
     <mc:Fallback>
-      <p:transition spd="slow" advTm="4999"/>
+      <p:transition spd="slow" advTm="2600"/>
     </mc:Fallback>
   </mc:AlternateContent>
   <p:timing>
@@ -15310,8 +15310,8 @@
           </a:p>
         </p:txBody>
       </p:sp>
-      <mc:AlternateContent xmlns:mc="http://schemas.openxmlformats.org/markup-compatibility/2006">
-        <mc:Choice xmlns:a14="http://schemas.microsoft.com/office/drawing/2010/main" Requires="a14">
+      <mc:AlternateContent xmlns:mc="http://schemas.openxmlformats.org/markup-compatibility/2006" xmlns:a14="http://schemas.microsoft.com/office/drawing/2010/main">
+        <mc:Choice Requires="a14">
           <p:sp>
             <p:nvSpPr>
               <p:cNvPr id="25" name="CaixaDeTexto 24">
@@ -15437,7 +15437,7 @@
             </p:txBody>
           </p:sp>
         </mc:Choice>
-        <mc:Fallback>
+        <mc:Fallback xmlns="">
           <p:sp>
             <p:nvSpPr>
               <p:cNvPr id="25" name="CaixaDeTexto 24">
@@ -17322,10 +17322,10 @@
   </p:clrMapOvr>
   <mc:AlternateContent xmlns:mc="http://schemas.openxmlformats.org/markup-compatibility/2006">
     <mc:Choice xmlns:p14="http://schemas.microsoft.com/office/powerpoint/2010/main" Requires="p14">
-      <p:transition spd="slow" p14:dur="2000" advTm="2199"/>
+      <p:transition spd="slow" p14:dur="2000" advTm="615"/>
     </mc:Choice>
     <mc:Fallback>
-      <p:transition spd="slow" advTm="2199"/>
+      <p:transition spd="slow" advTm="615"/>
     </mc:Fallback>
   </mc:AlternateContent>
 </p:sld>
@@ -17670,10 +17670,10 @@
   </p:clrMapOvr>
   <mc:AlternateContent xmlns:mc="http://schemas.openxmlformats.org/markup-compatibility/2006">
     <mc:Choice xmlns:p14="http://schemas.microsoft.com/office/powerpoint/2010/main" Requires="p14">
-      <p:transition spd="slow" p14:dur="2000" advTm="943"/>
+      <p:transition spd="slow" p14:dur="2000" advTm="607"/>
     </mc:Choice>
     <mc:Fallback>
-      <p:transition spd="slow" advTm="943"/>
+      <p:transition spd="slow" advTm="607"/>
     </mc:Fallback>
   </mc:AlternateContent>
 </p:sld>
@@ -17954,8 +17954,8 @@
           </a:p>
         </p:txBody>
       </p:sp>
-      <mc:AlternateContent xmlns:mc="http://schemas.openxmlformats.org/markup-compatibility/2006">
-        <mc:Choice xmlns:a14="http://schemas.microsoft.com/office/drawing/2010/main" Requires="a14">
+      <mc:AlternateContent xmlns:mc="http://schemas.openxmlformats.org/markup-compatibility/2006" xmlns:a14="http://schemas.microsoft.com/office/drawing/2010/main">
+        <mc:Choice Requires="a14">
           <p:sp>
             <p:nvSpPr>
               <p:cNvPr id="25" name="CaixaDeTexto 24">
@@ -18081,7 +18081,7 @@
             </p:txBody>
           </p:sp>
         </mc:Choice>
-        <mc:Fallback>
+        <mc:Fallback xmlns="">
           <p:sp>
             <p:nvSpPr>
               <p:cNvPr id="25" name="CaixaDeTexto 24">
@@ -20319,10 +20319,10 @@
   </p:clrMapOvr>
   <mc:AlternateContent xmlns:mc="http://schemas.openxmlformats.org/markup-compatibility/2006">
     <mc:Choice xmlns:p14="http://schemas.microsoft.com/office/powerpoint/2010/main" Requires="p14">
-      <p:transition spd="slow" p14:dur="2000" advTm="1488"/>
+      <p:transition spd="slow" p14:dur="2000" advTm="688"/>
     </mc:Choice>
     <mc:Fallback>
-      <p:transition spd="slow" advTm="1488"/>
+      <p:transition spd="slow" advTm="688"/>
     </mc:Fallback>
   </mc:AlternateContent>
 </p:sld>
@@ -20603,8 +20603,8 @@
           </a:p>
         </p:txBody>
       </p:sp>
-      <mc:AlternateContent xmlns:mc="http://schemas.openxmlformats.org/markup-compatibility/2006">
-        <mc:Choice xmlns:a14="http://schemas.microsoft.com/office/drawing/2010/main" Requires="a14">
+      <mc:AlternateContent xmlns:mc="http://schemas.openxmlformats.org/markup-compatibility/2006" xmlns:a14="http://schemas.microsoft.com/office/drawing/2010/main">
+        <mc:Choice Requires="a14">
           <p:sp>
             <p:nvSpPr>
               <p:cNvPr id="25" name="CaixaDeTexto 24">
@@ -20730,7 +20730,7 @@
             </p:txBody>
           </p:sp>
         </mc:Choice>
-        <mc:Fallback>
+        <mc:Fallback xmlns="">
           <p:sp>
             <p:nvSpPr>
               <p:cNvPr id="25" name="CaixaDeTexto 24">
@@ -23195,54 +23195,6 @@
       </p:sp>
       <p:sp>
         <p:nvSpPr>
-          <p:cNvPr id="44" name="Retângulo 43">
-            <a:extLst>
-              <a:ext uri="{FF2B5EF4-FFF2-40B4-BE49-F238E27FC236}">
-                <a16:creationId xmlns:a16="http://schemas.microsoft.com/office/drawing/2014/main" id="{9176C54E-4BAB-4274-A403-723D9E6C2D76}"/>
-              </a:ext>
-            </a:extLst>
-          </p:cNvPr>
-          <p:cNvSpPr/>
-          <p:nvPr/>
-        </p:nvSpPr>
-        <p:spPr>
-          <a:xfrm>
-            <a:off x="10782253" y="4129303"/>
-            <a:ext cx="276038" cy="307777"/>
-          </a:xfrm>
-          <a:prstGeom prst="rect">
-            <a:avLst/>
-          </a:prstGeom>
-          <a:noFill/>
-        </p:spPr>
-        <p:txBody>
-          <a:bodyPr wrap="none" lIns="91440" tIns="45720" rIns="91440" bIns="45720">
-            <a:spAutoFit/>
-          </a:bodyPr>
-          <a:lstStyle/>
-          <a:p>
-            <a:pPr algn="ctr"/>
-            <a:r>
-              <a:rPr lang="pt-BR" sz="1400" b="0" cap="none" spc="0" dirty="0">
-                <a:ln w="0"/>
-                <a:solidFill>
-                  <a:srgbClr val="FF0000"/>
-                </a:solidFill>
-                <a:effectLst>
-                  <a:outerShdw blurRad="38100" dist="19050" dir="2700000" algn="tl" rotWithShape="0">
-                    <a:schemeClr val="dk1">
-                      <a:alpha val="40000"/>
-                    </a:schemeClr>
-                  </a:outerShdw>
-                </a:effectLst>
-              </a:rPr>
-              <a:t>0</a:t>
-            </a:r>
-          </a:p>
-        </p:txBody>
-      </p:sp>
-      <p:sp>
-        <p:nvSpPr>
           <p:cNvPr id="47" name="Retângulo 46">
             <a:extLst>
               <a:ext uri="{FF2B5EF4-FFF2-40B4-BE49-F238E27FC236}">
@@ -23337,12 +23289,92 @@
           </a:p>
         </p:txBody>
       </p:sp>
+      <p:cxnSp>
+        <p:nvCxnSpPr>
+          <p:cNvPr id="15" name="Conector de Seta Reta 14">
+            <a:extLst>
+              <a:ext uri="{FF2B5EF4-FFF2-40B4-BE49-F238E27FC236}">
+                <a16:creationId xmlns:a16="http://schemas.microsoft.com/office/drawing/2014/main" id="{C975DBA4-2370-4B7B-A656-06EEAA2A1BB5}"/>
+              </a:ext>
+            </a:extLst>
+          </p:cNvPr>
+          <p:cNvCxnSpPr/>
+          <p:nvPr/>
+        </p:nvCxnSpPr>
+        <p:spPr>
+          <a:xfrm flipH="1" flipV="1">
+            <a:off x="7662530" y="2509284"/>
+            <a:ext cx="3196856" cy="1696094"/>
+          </a:xfrm>
+          <a:prstGeom prst="straightConnector1">
+            <a:avLst/>
+          </a:prstGeom>
+          <a:ln>
+            <a:noFill/>
+            <a:tailEnd type="triangle"/>
+          </a:ln>
+        </p:spPr>
+        <p:style>
+          <a:lnRef idx="1">
+            <a:schemeClr val="accent1"/>
+          </a:lnRef>
+          <a:fillRef idx="0">
+            <a:schemeClr val="accent1"/>
+          </a:fillRef>
+          <a:effectRef idx="0">
+            <a:schemeClr val="accent1"/>
+          </a:effectRef>
+          <a:fontRef idx="minor">
+            <a:schemeClr val="tx1"/>
+          </a:fontRef>
+        </p:style>
+      </p:cxnSp>
+      <p:cxnSp>
+        <p:nvCxnSpPr>
+          <p:cNvPr id="17" name="Conector de Seta Reta 16">
+            <a:extLst>
+              <a:ext uri="{FF2B5EF4-FFF2-40B4-BE49-F238E27FC236}">
+                <a16:creationId xmlns:a16="http://schemas.microsoft.com/office/drawing/2014/main" id="{69221B63-3AE1-4D26-B3E5-5490FAB44F0A}"/>
+              </a:ext>
+            </a:extLst>
+          </p:cNvPr>
+          <p:cNvCxnSpPr/>
+          <p:nvPr/>
+        </p:nvCxnSpPr>
+        <p:spPr>
+          <a:xfrm flipH="1" flipV="1">
+            <a:off x="7662530" y="2509284"/>
+            <a:ext cx="3491306" cy="3834809"/>
+          </a:xfrm>
+          <a:prstGeom prst="straightConnector1">
+            <a:avLst/>
+          </a:prstGeom>
+          <a:ln>
+            <a:noFill/>
+            <a:tailEnd type="triangle"/>
+          </a:ln>
+        </p:spPr>
+        <p:style>
+          <a:lnRef idx="1">
+            <a:schemeClr val="accent1"/>
+          </a:lnRef>
+          <a:fillRef idx="0">
+            <a:schemeClr val="accent1"/>
+          </a:fillRef>
+          <a:effectRef idx="0">
+            <a:schemeClr val="accent1"/>
+          </a:effectRef>
+          <a:fontRef idx="minor">
+            <a:schemeClr val="tx1"/>
+          </a:fontRef>
+        </p:style>
+      </p:cxnSp>
       <p:sp>
         <p:nvSpPr>
-          <p:cNvPr id="57" name="Retângulo 56">
+          <p:cNvPr id="49" name="Retângulo 48">
             <a:extLst>
               <a:ext uri="{FF2B5EF4-FFF2-40B4-BE49-F238E27FC236}">
-                <a16:creationId xmlns:a16="http://schemas.microsoft.com/office/drawing/2014/main" id="{70C8EFD9-DDAD-4EB6-A818-1EB8FFEEA002}"/>
+                <a16:creationId xmlns:a16="http://schemas.microsoft.com/office/drawing/2014/main" id="{F4356317-E8D9-4610-8B2B-80AB565C7A58}"/>
               </a:ext>
             </a:extLst>
           </p:cNvPr>
@@ -23351,7 +23383,132 @@
         </p:nvSpPr>
         <p:spPr>
           <a:xfrm>
-            <a:off x="10781864" y="4130064"/>
+            <a:off x="7223837" y="2293841"/>
+            <a:ext cx="502062" cy="307777"/>
+          </a:xfrm>
+          <a:prstGeom prst="rect">
+            <a:avLst/>
+          </a:prstGeom>
+          <a:noFill/>
+        </p:spPr>
+        <p:txBody>
+          <a:bodyPr wrap="none" lIns="91440" tIns="45720" rIns="91440" bIns="45720">
+            <a:spAutoFit/>
+          </a:bodyPr>
+          <a:lstStyle/>
+          <a:p>
+            <a:pPr algn="ctr"/>
+            <a:r>
+              <a:rPr lang="pt-BR" sz="1400" b="0" cap="none" spc="0" dirty="0">
+                <a:ln w="0"/>
+                <a:solidFill>
+                  <a:schemeClr val="bg1"/>
+                </a:solidFill>
+              </a:rPr>
+              <a:t>1 - 0</a:t>
+            </a:r>
+          </a:p>
+        </p:txBody>
+      </p:sp>
+      <p:cxnSp>
+        <p:nvCxnSpPr>
+          <p:cNvPr id="24" name="Conector de Seta Reta 23">
+            <a:extLst>
+              <a:ext uri="{FF2B5EF4-FFF2-40B4-BE49-F238E27FC236}">
+                <a16:creationId xmlns:a16="http://schemas.microsoft.com/office/drawing/2014/main" id="{4CFFF85B-659F-42DF-8758-0626F667B87F}"/>
+              </a:ext>
+            </a:extLst>
+          </p:cNvPr>
+          <p:cNvCxnSpPr>
+            <a:stCxn id="49" idx="1"/>
+          </p:cNvCxnSpPr>
+          <p:nvPr/>
+        </p:nvCxnSpPr>
+        <p:spPr>
+          <a:xfrm flipH="1" flipV="1">
+            <a:off x="5651299" y="2132876"/>
+            <a:ext cx="1572538" cy="314854"/>
+          </a:xfrm>
+          <a:prstGeom prst="straightConnector1">
+            <a:avLst/>
+          </a:prstGeom>
+          <a:ln>
+            <a:noFill/>
+            <a:tailEnd type="triangle"/>
+          </a:ln>
+        </p:spPr>
+        <p:style>
+          <a:lnRef idx="1">
+            <a:schemeClr val="accent1"/>
+          </a:lnRef>
+          <a:fillRef idx="0">
+            <a:schemeClr val="accent1"/>
+          </a:fillRef>
+          <a:effectRef idx="0">
+            <a:schemeClr val="accent1"/>
+          </a:effectRef>
+          <a:fontRef idx="minor">
+            <a:schemeClr val="tx1"/>
+          </a:fontRef>
+        </p:style>
+      </p:cxnSp>
+      <p:cxnSp>
+        <p:nvCxnSpPr>
+          <p:cNvPr id="27" name="Conector de Seta Reta 26">
+            <a:extLst>
+              <a:ext uri="{FF2B5EF4-FFF2-40B4-BE49-F238E27FC236}">
+                <a16:creationId xmlns:a16="http://schemas.microsoft.com/office/drawing/2014/main" id="{0B4EC4E3-75A8-403B-9B77-6086EB61FED0}"/>
+              </a:ext>
+            </a:extLst>
+          </p:cNvPr>
+          <p:cNvCxnSpPr>
+            <a:stCxn id="49" idx="1"/>
+          </p:cNvCxnSpPr>
+          <p:nvPr/>
+        </p:nvCxnSpPr>
+        <p:spPr>
+          <a:xfrm flipH="1" flipV="1">
+            <a:off x="5651299" y="1820241"/>
+            <a:ext cx="1572538" cy="627489"/>
+          </a:xfrm>
+          <a:prstGeom prst="straightConnector1">
+            <a:avLst/>
+          </a:prstGeom>
+          <a:ln>
+            <a:noFill/>
+            <a:tailEnd type="triangle"/>
+          </a:ln>
+        </p:spPr>
+        <p:style>
+          <a:lnRef idx="1">
+            <a:schemeClr val="accent1"/>
+          </a:lnRef>
+          <a:fillRef idx="0">
+            <a:schemeClr val="accent1"/>
+          </a:fillRef>
+          <a:effectRef idx="0">
+            <a:schemeClr val="accent1"/>
+          </a:effectRef>
+          <a:fontRef idx="minor">
+            <a:schemeClr val="tx1"/>
+          </a:fontRef>
+        </p:style>
+      </p:cxnSp>
+      <p:sp>
+        <p:nvSpPr>
+          <p:cNvPr id="58" name="Retângulo 57">
+            <a:extLst>
+              <a:ext uri="{FF2B5EF4-FFF2-40B4-BE49-F238E27FC236}">
+                <a16:creationId xmlns:a16="http://schemas.microsoft.com/office/drawing/2014/main" id="{9A19B3E3-93F1-4D46-A9B4-C4BA68DFFF71}"/>
+              </a:ext>
+            </a:extLst>
+          </p:cNvPr>
+          <p:cNvSpPr/>
+          <p:nvPr/>
+        </p:nvSpPr>
+        <p:spPr>
+          <a:xfrm>
+            <a:off x="5513280" y="1677421"/>
             <a:ext cx="276038" cy="307777"/>
           </a:xfrm>
           <a:prstGeom prst="rect">
@@ -23370,18 +23527,78 @@
               <a:rPr lang="pt-BR" sz="1400" b="0" cap="none" spc="0" dirty="0">
                 <a:ln w="0"/>
                 <a:solidFill>
-                  <a:srgbClr val="FF0000"/>
+                  <a:schemeClr val="bg1"/>
                 </a:solidFill>
-                <a:effectLst>
-                  <a:outerShdw blurRad="38100" dist="19050" dir="2700000" algn="tl" rotWithShape="0">
-                    <a:schemeClr val="dk1">
-                      <a:alpha val="40000"/>
-                    </a:schemeClr>
-                  </a:outerShdw>
-                </a:effectLst>
-              </a:rPr>
-              <a:t>0</a:t>
-            </a:r>
+              </a:rPr>
+              <a:t>1</a:t>
+            </a:r>
+            <a:endParaRPr lang="pt-BR" sz="1400" b="0" cap="none" spc="0" dirty="0">
+              <a:ln w="0"/>
+              <a:solidFill>
+                <a:schemeClr val="bg1"/>
+              </a:solidFill>
+              <a:effectLst>
+                <a:outerShdw blurRad="38100" dist="19050" dir="2700000" algn="tl" rotWithShape="0">
+                  <a:schemeClr val="dk1">
+                    <a:alpha val="40000"/>
+                  </a:schemeClr>
+                </a:outerShdw>
+              </a:effectLst>
+            </a:endParaRPr>
+          </a:p>
+        </p:txBody>
+      </p:sp>
+      <p:sp>
+        <p:nvSpPr>
+          <p:cNvPr id="62" name="Retângulo 61">
+            <a:extLst>
+              <a:ext uri="{FF2B5EF4-FFF2-40B4-BE49-F238E27FC236}">
+                <a16:creationId xmlns:a16="http://schemas.microsoft.com/office/drawing/2014/main" id="{7DCAD32F-50A5-4E1D-8F80-30E08885D961}"/>
+              </a:ext>
+            </a:extLst>
+          </p:cNvPr>
+          <p:cNvSpPr/>
+          <p:nvPr/>
+        </p:nvSpPr>
+        <p:spPr>
+          <a:xfrm>
+            <a:off x="5513280" y="1978335"/>
+            <a:ext cx="276038" cy="307777"/>
+          </a:xfrm>
+          <a:prstGeom prst="rect">
+            <a:avLst/>
+          </a:prstGeom>
+          <a:noFill/>
+        </p:spPr>
+        <p:txBody>
+          <a:bodyPr wrap="none" lIns="91440" tIns="45720" rIns="91440" bIns="45720">
+            <a:spAutoFit/>
+          </a:bodyPr>
+          <a:lstStyle/>
+          <a:p>
+            <a:pPr algn="ctr"/>
+            <a:r>
+              <a:rPr lang="pt-BR" sz="1400" b="0" cap="none" spc="0" dirty="0">
+                <a:ln w="0"/>
+                <a:solidFill>
+                  <a:schemeClr val="bg1"/>
+                </a:solidFill>
+              </a:rPr>
+              <a:t>1</a:t>
+            </a:r>
+            <a:endParaRPr lang="pt-BR" sz="1400" b="0" cap="none" spc="0" dirty="0">
+              <a:ln w="0"/>
+              <a:solidFill>
+                <a:schemeClr val="bg1"/>
+              </a:solidFill>
+              <a:effectLst>
+                <a:outerShdw blurRad="38100" dist="19050" dir="2700000" algn="tl" rotWithShape="0">
+                  <a:schemeClr val="dk1">
+                    <a:alpha val="40000"/>
+                  </a:schemeClr>
+                </a:outerShdw>
+              </a:effectLst>
+            </a:endParaRPr>
           </a:p>
         </p:txBody>
       </p:sp>
@@ -23400,10 +23617,10 @@
   </p:clrMapOvr>
   <mc:AlternateContent xmlns:mc="http://schemas.openxmlformats.org/markup-compatibility/2006">
     <mc:Choice xmlns:p14="http://schemas.microsoft.com/office/powerpoint/2010/main" Requires="p14">
-      <p:transition spd="slow" p14:dur="2000" advTm="7312"/>
+      <p:transition spd="slow" p14:dur="2000" advTm="14706"/>
     </mc:Choice>
     <mc:Fallback>
-      <p:transition spd="slow" advTm="7312"/>
+      <p:transition spd="slow" advTm="14706"/>
     </mc:Fallback>
   </mc:AlternateContent>
   <p:timing>
@@ -23497,112 +23714,9 @@
                                     <p:cond delay="0"/>
                                   </p:stCondLst>
                                   <p:childTnLst>
-                                    <p:animMotion origin="layout" path="M -3.125E-6 2.96296E-6 L -0.43229 -0.3581 " pathEditMode="relative" rAng="0" ptsTypes="AA">
+                                    <p:animMotion origin="layout" path="M 1.04167E-6 -4.44444E-6 L -0.13372 -0.30231 " pathEditMode="relative" rAng="0" ptsTypes="AA">
                                       <p:cBhvr>
                                         <p:cTn id="12" dur="500" fill="hold"/>
-                                        <p:tgtEl>
-                                          <p:spTgt spid="44"/>
-                                        </p:tgtEl>
-                                        <p:attrNameLst>
-                                          <p:attrName>ppt_x</p:attrName>
-                                          <p:attrName>ppt_y</p:attrName>
-                                        </p:attrNameLst>
-                                      </p:cBhvr>
-                                      <p:rCtr x="-21615" y="-17917"/>
-                                    </p:animMotion>
-                                  </p:childTnLst>
-                                </p:cTn>
-                              </p:par>
-                            </p:childTnLst>
-                          </p:cTn>
-                        </p:par>
-                      </p:childTnLst>
-                    </p:cTn>
-                  </p:par>
-                  <p:par>
-                    <p:cTn id="13" fill="hold">
-                      <p:stCondLst>
-                        <p:cond delay="indefinite"/>
-                      </p:stCondLst>
-                      <p:childTnLst>
-                        <p:par>
-                          <p:cTn id="14" fill="hold">
-                            <p:stCondLst>
-                              <p:cond delay="0"/>
-                            </p:stCondLst>
-                            <p:childTnLst>
-                              <p:par>
-                                <p:cTn id="15" presetID="1" presetClass="entr" presetSubtype="0" fill="hold" grpId="0" nodeType="clickEffect">
-                                  <p:stCondLst>
-                                    <p:cond delay="0"/>
-                                  </p:stCondLst>
-                                  <p:childTnLst>
-                                    <p:set>
-                                      <p:cBhvr>
-                                        <p:cTn id="16" dur="1" fill="hold">
-                                          <p:stCondLst>
-                                            <p:cond delay="0"/>
-                                          </p:stCondLst>
-                                        </p:cTn>
-                                        <p:tgtEl>
-                                          <p:spTgt spid="47"/>
-                                        </p:tgtEl>
-                                        <p:attrNameLst>
-                                          <p:attrName>style.visibility</p:attrName>
-                                        </p:attrNameLst>
-                                      </p:cBhvr>
-                                      <p:to>
-                                        <p:strVal val="visible"/>
-                                      </p:to>
-                                    </p:set>
-                                  </p:childTnLst>
-                                </p:cTn>
-                              </p:par>
-                              <p:par>
-                                <p:cTn id="17" presetID="6" presetClass="emph" presetSubtype="0" autoRev="1" fill="hold" grpId="1" nodeType="withEffect">
-                                  <p:stCondLst>
-                                    <p:cond delay="0"/>
-                                  </p:stCondLst>
-                                  <p:childTnLst>
-                                    <p:animScale>
-                                      <p:cBhvr>
-                                        <p:cTn id="18" dur="500" fill="hold"/>
-                                        <p:tgtEl>
-                                          <p:spTgt spid="47"/>
-                                        </p:tgtEl>
-                                      </p:cBhvr>
-                                      <p:by x="150000" y="150000"/>
-                                    </p:animScale>
-                                  </p:childTnLst>
-                                </p:cTn>
-                              </p:par>
-                            </p:childTnLst>
-                          </p:cTn>
-                        </p:par>
-                      </p:childTnLst>
-                    </p:cTn>
-                  </p:par>
-                  <p:par>
-                    <p:cTn id="19" fill="hold">
-                      <p:stCondLst>
-                        <p:cond delay="indefinite"/>
-                      </p:stCondLst>
-                      <p:childTnLst>
-                        <p:par>
-                          <p:cTn id="20" fill="hold">
-                            <p:stCondLst>
-                              <p:cond delay="0"/>
-                            </p:stCondLst>
-                            <p:childTnLst>
-                              <p:par>
-                                <p:cTn id="21" presetID="42" presetClass="path" presetSubtype="0" accel="50000" decel="50000" fill="hold" grpId="0" nodeType="clickEffect">
-                                  <p:stCondLst>
-                                    <p:cond delay="0"/>
-                                  </p:stCondLst>
-                                  <p:childTnLst>
-                                    <p:animMotion origin="layout" path="M 1.04167E-6 -4.44444E-6 L -0.13372 -0.30231 " pathEditMode="relative" rAng="0" ptsTypes="AA">
-                                      <p:cBhvr>
-                                        <p:cTn id="22" dur="500" fill="hold"/>
                                         <p:tgtEl>
                                           <p:spTgt spid="41"/>
                                         </p:tgtEl>
@@ -23617,14 +23731,14 @@
                                 </p:cTn>
                               </p:par>
                               <p:par>
-                                <p:cTn id="23" presetID="42" presetClass="path" presetSubtype="0" accel="50000" decel="50000" fill="hold" grpId="0" nodeType="withEffect">
+                                <p:cTn id="13" presetID="42" presetClass="path" presetSubtype="0" accel="50000" decel="50000" fill="hold" grpId="0" nodeType="withEffect">
                                   <p:stCondLst>
                                     <p:cond delay="0"/>
                                   </p:stCondLst>
                                   <p:childTnLst>
                                     <p:animMotion origin="layout" path="M 5E-6 -1.48148E-6 L -0.05469 -0.30185 " pathEditMode="relative" rAng="0" ptsTypes="AA">
                                       <p:cBhvr>
-                                        <p:cTn id="24" dur="500" fill="hold"/>
+                                        <p:cTn id="14" dur="500" fill="hold"/>
                                         <p:tgtEl>
                                           <p:spTgt spid="43"/>
                                         </p:tgtEl>
@@ -23645,40 +23759,88 @@
                     </p:cTn>
                   </p:par>
                   <p:par>
-                    <p:cTn id="25" fill="hold">
+                    <p:cTn id="15" fill="hold">
                       <p:stCondLst>
                         <p:cond delay="indefinite"/>
                       </p:stCondLst>
                       <p:childTnLst>
                         <p:par>
-                          <p:cTn id="26" fill="hold">
+                          <p:cTn id="16" fill="hold">
                             <p:stCondLst>
                               <p:cond delay="0"/>
                             </p:stCondLst>
                             <p:childTnLst>
                               <p:par>
-                                <p:cTn id="27" presetID="42" presetClass="path" presetSubtype="0" accel="50000" decel="50000" fill="hold" nodeType="clickEffect">
+                                <p:cTn id="17" presetID="7" presetClass="emph" presetSubtype="2" fill="hold" nodeType="clickEffect">
                                   <p:stCondLst>
                                     <p:cond delay="0"/>
                                   </p:stCondLst>
                                   <p:childTnLst>
-                                    <p:animMotion origin="layout" path="M -0.00157 0.00023 L -0.4336 -0.31366 " pathEditMode="relative" rAng="0" ptsTypes="AA">
+                                    <p:animClr clrSpc="rgb" dir="cw">
                                       <p:cBhvr>
-                                        <p:cTn id="28" dur="500" fill="hold"/>
+                                        <p:cTn id="18" dur="2000" fill="hold"/>
                                         <p:tgtEl>
-                                          <p:spTgt spid="57">
-                                            <p:txEl>
-                                              <p:pRg st="0" end="0"/>
-                                            </p:txEl>
-                                          </p:spTgt>
+                                          <p:spTgt spid="17"/>
                                         </p:tgtEl>
                                         <p:attrNameLst>
-                                          <p:attrName>ppt_x</p:attrName>
-                                          <p:attrName>ppt_y</p:attrName>
+                                          <p:attrName>stroke.color</p:attrName>
                                         </p:attrNameLst>
                                       </p:cBhvr>
-                                      <p:rCtr x="-21602" y="-15694"/>
-                                    </p:animMotion>
+                                      <p:to>
+                                        <a:srgbClr val="000000"/>
+                                      </p:to>
+                                    </p:animClr>
+                                    <p:set>
+                                      <p:cBhvr>
+                                        <p:cTn id="19" dur="2000" fill="hold"/>
+                                        <p:tgtEl>
+                                          <p:spTgt spid="17"/>
+                                        </p:tgtEl>
+                                        <p:attrNameLst>
+                                          <p:attrName>stroke.on</p:attrName>
+                                        </p:attrNameLst>
+                                      </p:cBhvr>
+                                      <p:to>
+                                        <p:strVal val="true"/>
+                                      </p:to>
+                                    </p:set>
+                                  </p:childTnLst>
+                                </p:cTn>
+                              </p:par>
+                              <p:par>
+                                <p:cTn id="20" presetID="7" presetClass="emph" presetSubtype="2" fill="hold" nodeType="withEffect">
+                                  <p:stCondLst>
+                                    <p:cond delay="0"/>
+                                  </p:stCondLst>
+                                  <p:childTnLst>
+                                    <p:animClr clrSpc="rgb" dir="cw">
+                                      <p:cBhvr>
+                                        <p:cTn id="21" dur="2000" fill="hold"/>
+                                        <p:tgtEl>
+                                          <p:spTgt spid="15"/>
+                                        </p:tgtEl>
+                                        <p:attrNameLst>
+                                          <p:attrName>stroke.color</p:attrName>
+                                        </p:attrNameLst>
+                                      </p:cBhvr>
+                                      <p:to>
+                                        <a:srgbClr val="000000"/>
+                                      </p:to>
+                                    </p:animClr>
+                                    <p:set>
+                                      <p:cBhvr>
+                                        <p:cTn id="22" dur="2000" fill="hold"/>
+                                        <p:tgtEl>
+                                          <p:spTgt spid="15"/>
+                                        </p:tgtEl>
+                                        <p:attrNameLst>
+                                          <p:attrName>stroke.on</p:attrName>
+                                        </p:attrNameLst>
+                                      </p:cBhvr>
+                                      <p:to>
+                                        <p:strVal val="true"/>
+                                      </p:to>
+                                    </p:set>
                                   </p:childTnLst>
                                 </p:cTn>
                               </p:par>
@@ -23689,59 +23851,193 @@
                     </p:cTn>
                   </p:par>
                   <p:par>
-                    <p:cTn id="29" fill="hold">
+                    <p:cTn id="23" fill="hold">
                       <p:stCondLst>
                         <p:cond delay="indefinite"/>
                       </p:stCondLst>
                       <p:childTnLst>
                         <p:par>
-                          <p:cTn id="30" fill="hold">
+                          <p:cTn id="24" fill="hold">
                             <p:stCondLst>
                               <p:cond delay="0"/>
                             </p:stCondLst>
                             <p:childTnLst>
                               <p:par>
-                                <p:cTn id="31" presetID="1" presetClass="entr" presetSubtype="0" fill="hold" grpId="0" nodeType="clickEffect">
+                                <p:cTn id="25" presetID="3" presetClass="emph" presetSubtype="2" fill="hold" grpId="0" nodeType="clickEffect">
                                   <p:stCondLst>
                                     <p:cond delay="0"/>
                                   </p:stCondLst>
                                   <p:childTnLst>
-                                    <p:set>
-                                      <p:cBhvr>
-                                        <p:cTn id="32" dur="1" fill="hold">
-                                          <p:stCondLst>
-                                            <p:cond delay="0"/>
-                                          </p:stCondLst>
-                                        </p:cTn>
+                                    <p:animClr clrSpc="rgb" dir="cw">
+                                      <p:cBhvr override="childStyle">
+                                        <p:cTn id="26" dur="2000" fill="hold"/>
                                         <p:tgtEl>
-                                          <p:spTgt spid="52"/>
+                                          <p:spTgt spid="49"/>
                                         </p:tgtEl>
                                         <p:attrNameLst>
-                                          <p:attrName>style.visibility</p:attrName>
+                                          <p:attrName>style.color</p:attrName>
                                         </p:attrNameLst>
                                       </p:cBhvr>
                                       <p:to>
-                                        <p:strVal val="visible"/>
+                                        <a:srgbClr val="000000"/>
+                                      </p:to>
+                                    </p:animClr>
+                                  </p:childTnLst>
+                                </p:cTn>
+                              </p:par>
+                            </p:childTnLst>
+                          </p:cTn>
+                        </p:par>
+                      </p:childTnLst>
+                    </p:cTn>
+                  </p:par>
+                  <p:par>
+                    <p:cTn id="27" fill="hold">
+                      <p:stCondLst>
+                        <p:cond delay="indefinite"/>
+                      </p:stCondLst>
+                      <p:childTnLst>
+                        <p:par>
+                          <p:cTn id="28" fill="hold">
+                            <p:stCondLst>
+                              <p:cond delay="0"/>
+                            </p:stCondLst>
+                            <p:childTnLst>
+                              <p:par>
+                                <p:cTn id="29" presetID="7" presetClass="emph" presetSubtype="2" fill="hold" nodeType="clickEffect">
+                                  <p:stCondLst>
+                                    <p:cond delay="0"/>
+                                  </p:stCondLst>
+                                  <p:childTnLst>
+                                    <p:animClr clrSpc="rgb" dir="cw">
+                                      <p:cBhvr>
+                                        <p:cTn id="30" dur="2000" fill="hold"/>
+                                        <p:tgtEl>
+                                          <p:spTgt spid="27"/>
+                                        </p:tgtEl>
+                                        <p:attrNameLst>
+                                          <p:attrName>stroke.color</p:attrName>
+                                        </p:attrNameLst>
+                                      </p:cBhvr>
+                                      <p:to>
+                                        <a:srgbClr val="000000"/>
+                                      </p:to>
+                                    </p:animClr>
+                                    <p:set>
+                                      <p:cBhvr>
+                                        <p:cTn id="31" dur="2000" fill="hold"/>
+                                        <p:tgtEl>
+                                          <p:spTgt spid="27"/>
+                                        </p:tgtEl>
+                                        <p:attrNameLst>
+                                          <p:attrName>stroke.on</p:attrName>
+                                        </p:attrNameLst>
+                                      </p:cBhvr>
+                                      <p:to>
+                                        <p:strVal val="true"/>
                                       </p:to>
                                     </p:set>
                                   </p:childTnLst>
                                 </p:cTn>
                               </p:par>
                               <p:par>
-                                <p:cTn id="33" presetID="6" presetClass="emph" presetSubtype="0" autoRev="1" fill="hold" grpId="1" nodeType="withEffect">
+                                <p:cTn id="32" presetID="7" presetClass="emph" presetSubtype="2" fill="hold" nodeType="withEffect">
                                   <p:stCondLst>
                                     <p:cond delay="0"/>
                                   </p:stCondLst>
                                   <p:childTnLst>
-                                    <p:animScale>
+                                    <p:animClr clrSpc="rgb" dir="cw">
                                       <p:cBhvr>
-                                        <p:cTn id="34" dur="500" fill="hold"/>
+                                        <p:cTn id="33" dur="2000" fill="hold"/>
                                         <p:tgtEl>
-                                          <p:spTgt spid="52"/>
+                                          <p:spTgt spid="24"/>
                                         </p:tgtEl>
+                                        <p:attrNameLst>
+                                          <p:attrName>stroke.color</p:attrName>
+                                        </p:attrNameLst>
                                       </p:cBhvr>
-                                      <p:by x="150000" y="150000"/>
-                                    </p:animScale>
+                                      <p:to>
+                                        <a:srgbClr val="000000"/>
+                                      </p:to>
+                                    </p:animClr>
+                                    <p:set>
+                                      <p:cBhvr>
+                                        <p:cTn id="34" dur="2000" fill="hold"/>
+                                        <p:tgtEl>
+                                          <p:spTgt spid="24"/>
+                                        </p:tgtEl>
+                                        <p:attrNameLst>
+                                          <p:attrName>stroke.on</p:attrName>
+                                        </p:attrNameLst>
+                                      </p:cBhvr>
+                                      <p:to>
+                                        <p:strVal val="true"/>
+                                      </p:to>
+                                    </p:set>
+                                  </p:childTnLst>
+                                </p:cTn>
+                              </p:par>
+                            </p:childTnLst>
+                          </p:cTn>
+                        </p:par>
+                      </p:childTnLst>
+                    </p:cTn>
+                  </p:par>
+                  <p:par>
+                    <p:cTn id="35" fill="hold">
+                      <p:stCondLst>
+                        <p:cond delay="indefinite"/>
+                      </p:stCondLst>
+                      <p:childTnLst>
+                        <p:par>
+                          <p:cTn id="36" fill="hold">
+                            <p:stCondLst>
+                              <p:cond delay="0"/>
+                            </p:stCondLst>
+                            <p:childTnLst>
+                              <p:par>
+                                <p:cTn id="37" presetID="3" presetClass="emph" presetSubtype="2" fill="hold" grpId="0" nodeType="clickEffect">
+                                  <p:stCondLst>
+                                    <p:cond delay="0"/>
+                                  </p:stCondLst>
+                                  <p:childTnLst>
+                                    <p:animClr clrSpc="rgb" dir="cw">
+                                      <p:cBhvr override="childStyle">
+                                        <p:cTn id="38" dur="2000" fill="hold"/>
+                                        <p:tgtEl>
+                                          <p:spTgt spid="58"/>
+                                        </p:tgtEl>
+                                        <p:attrNameLst>
+                                          <p:attrName>style.color</p:attrName>
+                                        </p:attrNameLst>
+                                      </p:cBhvr>
+                                      <p:to>
+                                        <a:srgbClr val="FFC000"/>
+                                      </p:to>
+                                    </p:animClr>
+                                  </p:childTnLst>
+                                </p:cTn>
+                              </p:par>
+                              <p:par>
+                                <p:cTn id="39" presetID="3" presetClass="emph" presetSubtype="2" fill="hold" grpId="0" nodeType="withEffect">
+                                  <p:stCondLst>
+                                    <p:cond delay="0"/>
+                                  </p:stCondLst>
+                                  <p:childTnLst>
+                                    <p:animClr clrSpc="rgb" dir="cw">
+                                      <p:cBhvr override="childStyle">
+                                        <p:cTn id="40" dur="2000" fill="hold"/>
+                                        <p:tgtEl>
+                                          <p:spTgt spid="62"/>
+                                        </p:tgtEl>
+                                        <p:attrNameLst>
+                                          <p:attrName>style.color</p:attrName>
+                                        </p:attrNameLst>
+                                      </p:cBhvr>
+                                      <p:to>
+                                        <a:srgbClr val="FFC000"/>
+                                      </p:to>
+                                    </p:animClr>
                                   </p:childTnLst>
                                 </p:cTn>
                               </p:par>
@@ -23777,11 +24073,9 @@
       <p:bldP spid="41" grpId="0"/>
       <p:bldP spid="42" grpId="0"/>
       <p:bldP spid="43" grpId="0"/>
-      <p:bldP spid="44" grpId="0"/>
-      <p:bldP spid="47" grpId="0"/>
-      <p:bldP spid="47" grpId="1"/>
-      <p:bldP spid="52" grpId="0"/>
-      <p:bldP spid="52" grpId="1"/>
+      <p:bldP spid="49" grpId="0"/>
+      <p:bldP spid="58" grpId="0"/>
+      <p:bldP spid="62" grpId="0"/>
     </p:bldLst>
   </p:timing>
 </p:sld>
@@ -24062,8 +24356,8 @@
           </a:p>
         </p:txBody>
       </p:sp>
-      <mc:AlternateContent xmlns:mc="http://schemas.openxmlformats.org/markup-compatibility/2006">
-        <mc:Choice xmlns:a14="http://schemas.microsoft.com/office/drawing/2010/main" Requires="a14">
+      <mc:AlternateContent xmlns:mc="http://schemas.openxmlformats.org/markup-compatibility/2006" xmlns:a14="http://schemas.microsoft.com/office/drawing/2010/main">
+        <mc:Choice Requires="a14">
           <p:sp>
             <p:nvSpPr>
               <p:cNvPr id="25" name="CaixaDeTexto 24">
@@ -24189,7 +24483,7 @@
             </p:txBody>
           </p:sp>
         </mc:Choice>
-        <mc:Fallback>
+        <mc:Fallback xmlns="">
           <p:sp>
             <p:nvSpPr>
               <p:cNvPr id="25" name="CaixaDeTexto 24">
@@ -26262,10 +26556,10 @@
               <a:rPr lang="pt-BR" sz="1400" b="0" cap="none" spc="0" dirty="0">
                 <a:ln w="0"/>
                 <a:solidFill>
-                  <a:srgbClr val="FF0000"/>
+                  <a:srgbClr val="FFC000"/>
                 </a:solidFill>
               </a:rPr>
-              <a:t>0</a:t>
+              <a:t>1</a:t>
             </a:r>
             <a:r>
               <a:rPr lang="pt-BR" sz="1400" b="0" cap="none" spc="0" dirty="0">
@@ -26412,10 +26706,10 @@
               <a:rPr lang="pt-BR" sz="1400" b="0" cap="none" spc="0" dirty="0">
                 <a:ln w="0"/>
                 <a:solidFill>
-                  <a:srgbClr val="FF0000"/>
+                  <a:srgbClr val="FFC000"/>
                 </a:solidFill>
               </a:rPr>
-              <a:t>0</a:t>
+              <a:t>1</a:t>
             </a:r>
             <a:r>
               <a:rPr lang="pt-BR" sz="1400" b="0" cap="none" spc="0" dirty="0">
@@ -26547,10 +26841,10 @@
   </p:clrMapOvr>
   <mc:AlternateContent xmlns:mc="http://schemas.openxmlformats.org/markup-compatibility/2006">
     <mc:Choice xmlns:p14="http://schemas.microsoft.com/office/powerpoint/2010/main" Requires="p14">
-      <p:transition spd="slow" p14:dur="2000" advTm="2343"/>
+      <p:transition spd="slow" p14:dur="2000" advTm="28531"/>
     </mc:Choice>
     <mc:Fallback>
-      <p:transition spd="slow" advTm="2343"/>
+      <p:transition spd="slow" advTm="28531"/>
     </mc:Fallback>
   </mc:AlternateContent>
   <p:timing>
@@ -27298,19 +27592,19 @@
 
 <file path=ppt/tags/tag2.xml><?xml version="1.0" encoding="utf-8"?>
 <p:tagLst xmlns:a="http://schemas.openxmlformats.org/drawingml/2006/main" xmlns:r="http://schemas.openxmlformats.org/officeDocument/2006/relationships" xmlns:p="http://schemas.openxmlformats.org/presentationml/2006/main">
-  <p:tag name="TIMING" val="|0.9|0.9|1.4|1.6"/>
+  <p:tag name="TIMING" val="|1.1|0.4|0.3|0.5"/>
 </p:tagLst>
 </file>
 
 <file path=ppt/tags/tag3.xml><?xml version="1.0" encoding="utf-8"?>
 <p:tagLst xmlns:a="http://schemas.openxmlformats.org/drawingml/2006/main" xmlns:r="http://schemas.openxmlformats.org/officeDocument/2006/relationships" xmlns:p="http://schemas.openxmlformats.org/presentationml/2006/main">
-  <p:tag name="TIMING" val="|0.8|0.9|1.1|1.3"/>
+  <p:tag name="TIMING" val="|0.3|0.2|0.2|0.1"/>
 </p:tagLst>
 </file>
 
 <file path=ppt/tags/tag4.xml><?xml version="1.0" encoding="utf-8"?>
 <p:tagLst xmlns:a="http://schemas.openxmlformats.org/drawingml/2006/main" xmlns:r="http://schemas.openxmlformats.org/officeDocument/2006/relationships" xmlns:p="http://schemas.openxmlformats.org/presentationml/2006/main">
-  <p:tag name="TIMING" val="|0.7|0.9|0.9|1.3"/>
+  <p:tag name="TIMING" val="|0.3|0.5|0.5|0.4"/>
 </p:tagLst>
 </file>
 
@@ -27334,7 +27628,7 @@
 
 <file path=ppt/tags/tag8.xml><?xml version="1.0" encoding="utf-8"?>
 <p:tagLst xmlns:a="http://schemas.openxmlformats.org/drawingml/2006/main" xmlns:r="http://schemas.openxmlformats.org/officeDocument/2006/relationships" xmlns:p="http://schemas.openxmlformats.org/presentationml/2006/main">
-  <p:tag name="TIMING" val="|1|1.1|1.3|1|1.1"/>
+  <p:tag name="TIMING" val="|0.5|0.5|0.9"/>
 </p:tagLst>
 </file>
 

</xml_diff>